<commit_message>
keep on the presentation
</commit_message>
<xml_diff>
--- a/Corre��o de Cor.pptx
+++ b/Corre��o de Cor.pptx
@@ -7,8 +7,9 @@
   <p:sldIdLst>
     <p:sldId id="258" r:id="rId2"/>
     <p:sldId id="259" r:id="rId3"/>
-    <p:sldId id="256" r:id="rId4"/>
-    <p:sldId id="257" r:id="rId5"/>
+    <p:sldId id="260" r:id="rId4"/>
+    <p:sldId id="256" r:id="rId5"/>
+    <p:sldId id="257" r:id="rId6"/>
   </p:sldIdLst>
   <p:sldSz cx="9144000" cy="6858000" type="screen4x3"/>
   <p:notesSz cx="6858000" cy="9144000"/>
@@ -291,6 +292,7 @@
           <a:p>
             <a:fld id="{9AD88046-C0F5-4E6F-BF07-B9C0FB1E1FA4}" type="datetimeFigureOut">
               <a:rPr lang="pt-BR" smtClean="0"/>
+              <a:pPr/>
               <a:t>17/04/2012</a:t>
             </a:fld>
             <a:endParaRPr lang="pt-BR"/>
@@ -333,6 +335,7 @@
           <a:p>
             <a:fld id="{4A302629-0CCE-4BD1-95FD-F509CFED58F4}" type="slidenum">
               <a:rPr lang="pt-BR" smtClean="0"/>
+              <a:pPr/>
               <a:t>‹nº›</a:t>
             </a:fld>
             <a:endParaRPr lang="pt-BR"/>
@@ -456,6 +459,7 @@
           <a:p>
             <a:fld id="{9AD88046-C0F5-4E6F-BF07-B9C0FB1E1FA4}" type="datetimeFigureOut">
               <a:rPr lang="pt-BR" smtClean="0"/>
+              <a:pPr/>
               <a:t>17/04/2012</a:t>
             </a:fld>
             <a:endParaRPr lang="pt-BR"/>
@@ -498,6 +502,7 @@
           <a:p>
             <a:fld id="{4A302629-0CCE-4BD1-95FD-F509CFED58F4}" type="slidenum">
               <a:rPr lang="pt-BR" smtClean="0"/>
+              <a:pPr/>
               <a:t>‹nº›</a:t>
             </a:fld>
             <a:endParaRPr lang="pt-BR"/>
@@ -631,6 +636,7 @@
           <a:p>
             <a:fld id="{9AD88046-C0F5-4E6F-BF07-B9C0FB1E1FA4}" type="datetimeFigureOut">
               <a:rPr lang="pt-BR" smtClean="0"/>
+              <a:pPr/>
               <a:t>17/04/2012</a:t>
             </a:fld>
             <a:endParaRPr lang="pt-BR"/>
@@ -673,6 +679,7 @@
           <a:p>
             <a:fld id="{4A302629-0CCE-4BD1-95FD-F509CFED58F4}" type="slidenum">
               <a:rPr lang="pt-BR" smtClean="0"/>
+              <a:pPr/>
               <a:t>‹nº›</a:t>
             </a:fld>
             <a:endParaRPr lang="pt-BR"/>
@@ -796,6 +803,7 @@
           <a:p>
             <a:fld id="{9AD88046-C0F5-4E6F-BF07-B9C0FB1E1FA4}" type="datetimeFigureOut">
               <a:rPr lang="pt-BR" smtClean="0"/>
+              <a:pPr/>
               <a:t>17/04/2012</a:t>
             </a:fld>
             <a:endParaRPr lang="pt-BR"/>
@@ -838,6 +846,7 @@
           <a:p>
             <a:fld id="{4A302629-0CCE-4BD1-95FD-F509CFED58F4}" type="slidenum">
               <a:rPr lang="pt-BR" smtClean="0"/>
+              <a:pPr/>
               <a:t>‹nº›</a:t>
             </a:fld>
             <a:endParaRPr lang="pt-BR"/>
@@ -1037,6 +1046,7 @@
           <a:p>
             <a:fld id="{9AD88046-C0F5-4E6F-BF07-B9C0FB1E1FA4}" type="datetimeFigureOut">
               <a:rPr lang="pt-BR" smtClean="0"/>
+              <a:pPr/>
               <a:t>17/04/2012</a:t>
             </a:fld>
             <a:endParaRPr lang="pt-BR"/>
@@ -1079,6 +1089,7 @@
           <a:p>
             <a:fld id="{4A302629-0CCE-4BD1-95FD-F509CFED58F4}" type="slidenum">
               <a:rPr lang="pt-BR" smtClean="0"/>
+              <a:pPr/>
               <a:t>‹nº›</a:t>
             </a:fld>
             <a:endParaRPr lang="pt-BR"/>
@@ -1320,6 +1331,7 @@
           <a:p>
             <a:fld id="{9AD88046-C0F5-4E6F-BF07-B9C0FB1E1FA4}" type="datetimeFigureOut">
               <a:rPr lang="pt-BR" smtClean="0"/>
+              <a:pPr/>
               <a:t>17/04/2012</a:t>
             </a:fld>
             <a:endParaRPr lang="pt-BR"/>
@@ -1362,6 +1374,7 @@
           <a:p>
             <a:fld id="{4A302629-0CCE-4BD1-95FD-F509CFED58F4}" type="slidenum">
               <a:rPr lang="pt-BR" smtClean="0"/>
+              <a:pPr/>
               <a:t>‹nº›</a:t>
             </a:fld>
             <a:endParaRPr lang="pt-BR"/>
@@ -1737,6 +1750,7 @@
           <a:p>
             <a:fld id="{9AD88046-C0F5-4E6F-BF07-B9C0FB1E1FA4}" type="datetimeFigureOut">
               <a:rPr lang="pt-BR" smtClean="0"/>
+              <a:pPr/>
               <a:t>17/04/2012</a:t>
             </a:fld>
             <a:endParaRPr lang="pt-BR"/>
@@ -1779,6 +1793,7 @@
           <a:p>
             <a:fld id="{4A302629-0CCE-4BD1-95FD-F509CFED58F4}" type="slidenum">
               <a:rPr lang="pt-BR" smtClean="0"/>
+              <a:pPr/>
               <a:t>‹nº›</a:t>
             </a:fld>
             <a:endParaRPr lang="pt-BR"/>
@@ -1850,6 +1865,7 @@
           <a:p>
             <a:fld id="{9AD88046-C0F5-4E6F-BF07-B9C0FB1E1FA4}" type="datetimeFigureOut">
               <a:rPr lang="pt-BR" smtClean="0"/>
+              <a:pPr/>
               <a:t>17/04/2012</a:t>
             </a:fld>
             <a:endParaRPr lang="pt-BR"/>
@@ -1892,6 +1908,7 @@
           <a:p>
             <a:fld id="{4A302629-0CCE-4BD1-95FD-F509CFED58F4}" type="slidenum">
               <a:rPr lang="pt-BR" smtClean="0"/>
+              <a:pPr/>
               <a:t>‹nº›</a:t>
             </a:fld>
             <a:endParaRPr lang="pt-BR"/>
@@ -1940,6 +1957,7 @@
           <a:p>
             <a:fld id="{9AD88046-C0F5-4E6F-BF07-B9C0FB1E1FA4}" type="datetimeFigureOut">
               <a:rPr lang="pt-BR" smtClean="0"/>
+              <a:pPr/>
               <a:t>17/04/2012</a:t>
             </a:fld>
             <a:endParaRPr lang="pt-BR"/>
@@ -1982,6 +2000,7 @@
           <a:p>
             <a:fld id="{4A302629-0CCE-4BD1-95FD-F509CFED58F4}" type="slidenum">
               <a:rPr lang="pt-BR" smtClean="0"/>
+              <a:pPr/>
               <a:t>‹nº›</a:t>
             </a:fld>
             <a:endParaRPr lang="pt-BR"/>
@@ -2212,6 +2231,7 @@
           <a:p>
             <a:fld id="{9AD88046-C0F5-4E6F-BF07-B9C0FB1E1FA4}" type="datetimeFigureOut">
               <a:rPr lang="pt-BR" smtClean="0"/>
+              <a:pPr/>
               <a:t>17/04/2012</a:t>
             </a:fld>
             <a:endParaRPr lang="pt-BR"/>
@@ -2254,6 +2274,7 @@
           <a:p>
             <a:fld id="{4A302629-0CCE-4BD1-95FD-F509CFED58F4}" type="slidenum">
               <a:rPr lang="pt-BR" smtClean="0"/>
+              <a:pPr/>
               <a:t>‹nº›</a:t>
             </a:fld>
             <a:endParaRPr lang="pt-BR"/>
@@ -2460,6 +2481,7 @@
           <a:p>
             <a:fld id="{9AD88046-C0F5-4E6F-BF07-B9C0FB1E1FA4}" type="datetimeFigureOut">
               <a:rPr lang="pt-BR" smtClean="0"/>
+              <a:pPr/>
               <a:t>17/04/2012</a:t>
             </a:fld>
             <a:endParaRPr lang="pt-BR"/>
@@ -2502,6 +2524,7 @@
           <a:p>
             <a:fld id="{4A302629-0CCE-4BD1-95FD-F509CFED58F4}" type="slidenum">
               <a:rPr lang="pt-BR" smtClean="0"/>
+              <a:pPr/>
               <a:t>‹nº›</a:t>
             </a:fld>
             <a:endParaRPr lang="pt-BR"/>
@@ -2668,6 +2691,7 @@
           <a:p>
             <a:fld id="{9AD88046-C0F5-4E6F-BF07-B9C0FB1E1FA4}" type="datetimeFigureOut">
               <a:rPr lang="pt-BR" smtClean="0"/>
+              <a:pPr/>
               <a:t>17/04/2012</a:t>
             </a:fld>
             <a:endParaRPr lang="pt-BR"/>
@@ -2746,6 +2770,7 @@
           <a:p>
             <a:fld id="{4A302629-0CCE-4BD1-95FD-F509CFED58F4}" type="slidenum">
               <a:rPr lang="pt-BR" smtClean="0"/>
+              <a:pPr/>
               <a:t>‹nº›</a:t>
             </a:fld>
             <a:endParaRPr lang="pt-BR"/>
@@ -3217,6 +3242,147 @@
           <a:chExt cx="0" cy="0"/>
         </a:xfrm>
       </p:grpSpPr>
+      <p:sp>
+        <p:nvSpPr>
+          <p:cNvPr id="4" name="CaixaDeTexto 3"/>
+          <p:cNvSpPr txBox="1"/>
+          <p:nvPr/>
+        </p:nvSpPr>
+        <p:spPr>
+          <a:xfrm>
+            <a:off x="0" y="0"/>
+            <a:ext cx="9144000" cy="692497"/>
+          </a:xfrm>
+          <a:prstGeom prst="rect">
+            <a:avLst/>
+          </a:prstGeom>
+        </p:spPr>
+        <p:style>
+          <a:lnRef idx="0">
+            <a:schemeClr val="accent1"/>
+          </a:lnRef>
+          <a:fillRef idx="3">
+            <a:schemeClr val="accent1"/>
+          </a:fillRef>
+          <a:effectRef idx="3">
+            <a:schemeClr val="accent1"/>
+          </a:effectRef>
+          <a:fontRef idx="minor">
+            <a:schemeClr val="lt1"/>
+          </a:fontRef>
+        </p:style>
+        <p:txBody>
+          <a:bodyPr wrap="square" rtlCol="0">
+            <a:spAutoFit/>
+          </a:bodyPr>
+          <a:lstStyle/>
+          <a:p>
+            <a:pPr algn="ctr"/>
+            <a:r>
+              <a:rPr lang="pt-BR" sz="2800" dirty="0" smtClean="0"/>
+              <a:t>Conceito Rápido</a:t>
+            </a:r>
+            <a:endParaRPr lang="pt-BR" sz="2800" dirty="0" smtClean="0"/>
+          </a:p>
+          <a:p>
+            <a:pPr algn="ctr"/>
+            <a:endParaRPr lang="pt-BR" sz="1100" dirty="0"/>
+          </a:p>
+        </p:txBody>
+      </p:sp>
+      <p:sp>
+        <p:nvSpPr>
+          <p:cNvPr id="5" name="CaixaDeTexto 4"/>
+          <p:cNvSpPr txBox="1"/>
+          <p:nvPr/>
+        </p:nvSpPr>
+        <p:spPr>
+          <a:xfrm>
+            <a:off x="2663281" y="2060848"/>
+            <a:ext cx="6480719" cy="1477328"/>
+          </a:xfrm>
+          <a:prstGeom prst="rect">
+            <a:avLst/>
+          </a:prstGeom>
+          <a:noFill/>
+        </p:spPr>
+        <p:txBody>
+          <a:bodyPr wrap="square" rtlCol="0">
+            <a:spAutoFit/>
+          </a:bodyPr>
+          <a:lstStyle/>
+          <a:p>
+            <a:pPr algn="just"/>
+            <a:r>
+              <a:rPr lang="pt-BR" dirty="0" smtClean="0"/>
+              <a:t>Correção de cor é a técnica aplicada para controlar os níveis de luminosidade e intensidade das cores, ou até mesmo neutralizar certas cores em alguns casos.</a:t>
+            </a:r>
+          </a:p>
+          <a:p>
+            <a:pPr algn="just"/>
+            <a:endParaRPr lang="pt-BR" dirty="0" smtClean="0"/>
+          </a:p>
+          <a:p>
+            <a:pPr algn="just"/>
+            <a:r>
+              <a:rPr lang="pt-BR" dirty="0" smtClean="0"/>
+              <a:t>Com isso, obtemos fotos mais nítidas, bonitas e criativas.</a:t>
+            </a:r>
+            <a:endParaRPr lang="pt-BR" dirty="0"/>
+          </a:p>
+        </p:txBody>
+      </p:sp>
+      <p:pic>
+        <p:nvPicPr>
+          <p:cNvPr id="1026" name="Picture 2" descr="http://weknowmemes.com/wp-content/uploads/2011/12/tada-will-smith-rage-face.png"/>
+          <p:cNvPicPr>
+            <a:picLocks noChangeAspect="1" noChangeArrowheads="1"/>
+          </p:cNvPicPr>
+          <p:nvPr/>
+        </p:nvPicPr>
+        <p:blipFill>
+          <a:blip r:embed="rId2" cstate="print"/>
+          <a:srcRect/>
+          <a:stretch>
+            <a:fillRect/>
+          </a:stretch>
+        </p:blipFill>
+        <p:spPr bwMode="auto">
+          <a:xfrm>
+            <a:off x="-108520" y="1340768"/>
+            <a:ext cx="2857500" cy="4095750"/>
+          </a:xfrm>
+          <a:prstGeom prst="rect">
+            <a:avLst/>
+          </a:prstGeom>
+          <a:noFill/>
+        </p:spPr>
+      </p:pic>
+    </p:spTree>
+  </p:cSld>
+  <p:clrMapOvr>
+    <a:masterClrMapping/>
+  </p:clrMapOvr>
+</p:sld>
+</file>
+
+<file path=ppt/slides/slide4.xml><?xml version="1.0" encoding="utf-8"?>
+<p:sld xmlns:a="http://schemas.openxmlformats.org/drawingml/2006/main" xmlns:r="http://schemas.openxmlformats.org/officeDocument/2006/relationships" xmlns:p="http://schemas.openxmlformats.org/presentationml/2006/main">
+  <p:cSld>
+    <p:spTree>
+      <p:nvGrpSpPr>
+        <p:cNvPr id="1" name=""/>
+        <p:cNvGrpSpPr/>
+        <p:nvPr/>
+      </p:nvGrpSpPr>
+      <p:grpSpPr>
+        <a:xfrm>
+          <a:off x="0" y="0"/>
+          <a:ext cx="0" cy="0"/>
+          <a:chOff x="0" y="0"/>
+          <a:chExt cx="0" cy="0"/>
+        </a:xfrm>
+      </p:grpSpPr>
       <p:pic>
         <p:nvPicPr>
           <p:cNvPr id="1028" name="Picture 4" descr="http://www.vertseven.com/2d/color_correction-2002_photo.jpg"/>
@@ -3324,7 +3490,7 @@
 </p:sld>
 </file>
 
-<file path=ppt/slides/slide4.xml><?xml version="1.0" encoding="utf-8"?>
+<file path=ppt/slides/slide5.xml><?xml version="1.0" encoding="utf-8"?>
 <p:sld xmlns:a="http://schemas.openxmlformats.org/drawingml/2006/main" xmlns:r="http://schemas.openxmlformats.org/officeDocument/2006/relationships" xmlns:p="http://schemas.openxmlformats.org/presentationml/2006/main">
   <p:cSld>
     <p:spTree>

</xml_diff>